<commit_message>
Powerpoint because why not
</commit_message>
<xml_diff>
--- a/Matrix Actions on Bivariate Polynomials.pptx
+++ b/Matrix Actions on Bivariate Polynomials.pptx
@@ -15,16 +15,14 @@
     <p:sldId id="264" r:id="rId9"/>
     <p:sldId id="265" r:id="rId10"/>
     <p:sldId id="266" r:id="rId11"/>
-    <p:sldId id="267" r:id="rId12"/>
-    <p:sldId id="268" r:id="rId13"/>
-    <p:sldId id="269" r:id="rId14"/>
-    <p:sldId id="270" r:id="rId15"/>
-    <p:sldId id="271" r:id="rId16"/>
-    <p:sldId id="272" r:id="rId17"/>
-    <p:sldId id="273" r:id="rId18"/>
-    <p:sldId id="274" r:id="rId19"/>
-    <p:sldId id="275" r:id="rId20"/>
-    <p:sldId id="276" r:id="rId21"/>
+    <p:sldId id="268" r:id="rId12"/>
+    <p:sldId id="269" r:id="rId13"/>
+    <p:sldId id="271" r:id="rId14"/>
+    <p:sldId id="272" r:id="rId15"/>
+    <p:sldId id="273" r:id="rId16"/>
+    <p:sldId id="274" r:id="rId17"/>
+    <p:sldId id="275" r:id="rId18"/>
+    <p:sldId id="276" r:id="rId19"/>
   </p:sldIdLst>
   <p:sldSz cx="12192000" cy="6858000"/>
   <p:notesSz cx="6858000" cy="9144000"/>
@@ -3652,7 +3650,7 @@
           <a:p>
             <a:r>
               <a:rPr lang="en-US" dirty="0" smtClean="0"/>
-              <a:t>Orbits</a:t>
+              <a:t>Orbits	</a:t>
             </a:r>
             <a:endParaRPr lang="en-US" dirty="0"/>
           </a:p>
@@ -3665,7 +3663,7 @@
             <a:spLocks noGrp="1"/>
           </p:cNvSpPr>
           <p:nvPr>
-            <p:ph sz="half" idx="1"/>
+            <p:ph idx="1"/>
           </p:nvPr>
         </p:nvSpPr>
         <p:spPr/>
@@ -3677,23 +3675,16 @@
           <a:p>
             <a:r>
               <a:rPr lang="en-US" sz="3200" dirty="0" smtClean="0"/>
-              <a:t>Every element eventually maps back to itself</a:t>
-            </a:r>
-          </a:p>
-          <a:p>
-            <a:endParaRPr lang="en-US" sz="3200" dirty="0"/>
+              <a:t>Repeat the action on R[x, y]2 using SL2 mod 2. </a:t>
+            </a:r>
+          </a:p>
+          <a:p>
+            <a:endParaRPr lang="en-US" sz="3200" dirty="0" smtClean="0"/>
           </a:p>
           <a:p>
             <a:r>
               <a:rPr lang="en-US" sz="3200" dirty="0" smtClean="0"/>
-              <a:t>Example: </a:t>
-            </a:r>
-          </a:p>
-          <a:p>
-            <a:pPr lvl="1"/>
-            <a:r>
-              <a:rPr lang="en-US" sz="3200" dirty="0" smtClean="0"/>
-              <a:t>y</a:t>
+              <a:t>We find that {0} and {x</a:t>
             </a:r>
             <a:r>
               <a:rPr lang="en-US" sz="3200" baseline="30000" dirty="0" smtClean="0"/>
@@ -3701,7 +3692,15 @@
             </a:r>
             <a:r>
               <a:rPr lang="en-US" sz="3200" dirty="0" smtClean="0"/>
-              <a:t> -&gt; x</a:t>
+              <a:t> + </a:t>
+            </a:r>
+            <a:r>
+              <a:rPr lang="en-US" sz="3200" dirty="0" err="1" smtClean="0"/>
+              <a:t>xy</a:t>
+            </a:r>
+            <a:r>
+              <a:rPr lang="en-US" sz="3200" dirty="0" smtClean="0"/>
+              <a:t> + y</a:t>
             </a:r>
             <a:r>
               <a:rPr lang="en-US" sz="3200" baseline="30000" dirty="0" smtClean="0"/>
@@ -3709,79 +3708,16 @@
             </a:r>
             <a:r>
               <a:rPr lang="en-US" sz="3200" dirty="0" smtClean="0"/>
-              <a:t> -&gt; y</a:t>
-            </a:r>
-            <a:r>
-              <a:rPr lang="en-US" sz="3200" baseline="30000" dirty="0" smtClean="0"/>
-              <a:t>2</a:t>
-            </a:r>
-          </a:p>
-          <a:p>
-            <a:pPr lvl="1"/>
-            <a:endParaRPr lang="en-US" sz="3200" baseline="30000" dirty="0"/>
-          </a:p>
-          <a:p>
-            <a:r>
-              <a:rPr lang="en-US" sz="3200" dirty="0" smtClean="0"/>
-              <a:t>{x</a:t>
-            </a:r>
-            <a:r>
-              <a:rPr lang="en-US" sz="3200" baseline="30000" dirty="0" smtClean="0"/>
-              <a:t>2</a:t>
-            </a:r>
-            <a:r>
-              <a:rPr lang="en-US" sz="3200" dirty="0" smtClean="0"/>
-              <a:t>, y</a:t>
-            </a:r>
-            <a:r>
-              <a:rPr lang="en-US" sz="3200" baseline="30000" dirty="0" smtClean="0"/>
-              <a:t>2</a:t>
-            </a:r>
-            <a:r>
-              <a:rPr lang="en-US" sz="3200" dirty="0" smtClean="0"/>
-              <a:t>} called an </a:t>
-            </a:r>
-            <a:r>
-              <a:rPr lang="en-US" sz="3200" i="1" dirty="0" smtClean="0"/>
-              <a:t>orbit</a:t>
+              <a:t>} always map to themselves in SL2 mod 2! </a:t>
             </a:r>
             <a:endParaRPr lang="en-US" sz="3200" dirty="0"/>
           </a:p>
         </p:txBody>
       </p:sp>
-      <p:pic>
-        <p:nvPicPr>
-          <p:cNvPr id="6" name="Content Placeholder 5"/>
-          <p:cNvPicPr>
-            <a:picLocks noGrp="1" noChangeAspect="1"/>
-          </p:cNvPicPr>
-          <p:nvPr>
-            <p:ph sz="half" idx="2"/>
-          </p:nvPr>
-        </p:nvPicPr>
-        <p:blipFill>
-          <a:blip r:embed="rId2">
-            <a:extLst>
-              <a:ext uri="{28A0092B-C50C-407E-A947-70E740481C1C}">
-                <a14:useLocalDpi xmlns:a14="http://schemas.microsoft.com/office/drawing/2010/main" val="0"/>
-              </a:ext>
-            </a:extLst>
-          </a:blip>
-          <a:stretch>
-            <a:fillRect/>
-          </a:stretch>
-        </p:blipFill>
-        <p:spPr>
-          <a:xfrm>
-            <a:off x="7818438" y="2243750"/>
-            <a:ext cx="3475037" cy="2370501"/>
-          </a:xfrm>
-        </p:spPr>
-      </p:pic>
     </p:spTree>
     <p:extLst>
       <p:ext uri="{BB962C8B-B14F-4D97-AF65-F5344CB8AC3E}">
-        <p14:creationId xmlns:p14="http://schemas.microsoft.com/office/powerpoint/2010/main" val="1267195497"/>
+        <p14:creationId xmlns:p14="http://schemas.microsoft.com/office/powerpoint/2010/main" val="165968520"/>
       </p:ext>
     </p:extLst>
   </p:cSld>
@@ -3825,7 +3761,7 @@
           <a:p>
             <a:r>
               <a:rPr lang="en-US" dirty="0" smtClean="0"/>
-              <a:t>Orbits	</a:t>
+              <a:t>Higher dimensions of R[x, y]k</a:t>
             </a:r>
             <a:endParaRPr lang="en-US" dirty="0"/>
           </a:p>
@@ -3850,49 +3786,70 @@
           <a:p>
             <a:r>
               <a:rPr lang="en-US" sz="3200" dirty="0" smtClean="0"/>
-              <a:t>Repeat the action on R[x, y]2 using SL2 mod 2. </a:t>
-            </a:r>
-          </a:p>
-          <a:p>
-            <a:endParaRPr lang="en-US" sz="3200" dirty="0" smtClean="0"/>
+              <a:t>We can continue this process in k = 3, 4, 5, etc.</a:t>
+            </a:r>
+          </a:p>
+          <a:p>
+            <a:endParaRPr lang="en-US" sz="3200" dirty="0"/>
           </a:p>
           <a:p>
             <a:r>
               <a:rPr lang="en-US" sz="3200" dirty="0" smtClean="0"/>
-              <a:t>We find that {0} and {x</a:t>
-            </a:r>
-            <a:r>
-              <a:rPr lang="en-US" sz="3200" baseline="30000" dirty="0" smtClean="0"/>
-              <a:t>2</a:t>
+              <a:t>New notation: </a:t>
+            </a:r>
+            <a:r>
+              <a:rPr lang="en-US" sz="3200" dirty="0"/>
+              <a:t>R[x, </a:t>
             </a:r>
             <a:r>
               <a:rPr lang="en-US" sz="3200" dirty="0" smtClean="0"/>
-              <a:t> + </a:t>
-            </a:r>
-            <a:r>
-              <a:rPr lang="en-US" sz="3200" dirty="0" err="1" smtClean="0"/>
-              <a:t>xy</a:t>
-            </a:r>
+              <a:t>y]k = </a:t>
+            </a:r>
+            <a:r>
+              <a:rPr lang="en-US" sz="3200" u="sng" dirty="0" smtClean="0"/>
+              <a:t>k + 1</a:t>
+            </a:r>
+          </a:p>
+          <a:p>
+            <a:endParaRPr lang="en-US" sz="3200" u="sng" dirty="0"/>
+          </a:p>
+          <a:p>
             <a:r>
               <a:rPr lang="en-US" sz="3200" dirty="0" smtClean="0"/>
-              <a:t> + y</a:t>
-            </a:r>
-            <a:r>
-              <a:rPr lang="en-US" sz="3200" baseline="30000" dirty="0" smtClean="0"/>
-              <a:t>2</a:t>
+              <a:t>Continue the action on </a:t>
+            </a:r>
+            <a:r>
+              <a:rPr lang="en-US" sz="3200" u="sng" dirty="0" smtClean="0"/>
+              <a:t>4</a:t>
             </a:r>
             <a:r>
               <a:rPr lang="en-US" sz="3200" dirty="0" smtClean="0"/>
-              <a:t>} always map to themselves in SL2 mod 2! </a:t>
-            </a:r>
-            <a:endParaRPr lang="en-US" sz="3200" dirty="0"/>
+              <a:t>, </a:t>
+            </a:r>
+            <a:r>
+              <a:rPr lang="en-US" sz="3200" u="sng" dirty="0" smtClean="0"/>
+              <a:t>5,</a:t>
+            </a:r>
+            <a:r>
+              <a:rPr lang="en-US" sz="3200" i="1" dirty="0" smtClean="0"/>
+              <a:t> </a:t>
+            </a:r>
+            <a:r>
+              <a:rPr lang="en-US" sz="3200" i="1" u="sng" dirty="0" smtClean="0"/>
+              <a:t>6,</a:t>
+            </a:r>
+            <a:r>
+              <a:rPr lang="en-US" sz="3200" i="1" dirty="0" smtClean="0"/>
+              <a:t> etc…</a:t>
+            </a:r>
+            <a:endParaRPr lang="en-US" sz="3200" i="1" dirty="0"/>
           </a:p>
         </p:txBody>
       </p:sp>
     </p:spTree>
     <p:extLst>
       <p:ext uri="{BB962C8B-B14F-4D97-AF65-F5344CB8AC3E}">
-        <p14:creationId xmlns:p14="http://schemas.microsoft.com/office/powerpoint/2010/main" val="165968520"/>
+        <p14:creationId xmlns:p14="http://schemas.microsoft.com/office/powerpoint/2010/main" val="2339670299"/>
       </p:ext>
     </p:extLst>
   </p:cSld>
@@ -3936,7 +3893,7 @@
           <a:p>
             <a:r>
               <a:rPr lang="en-US" dirty="0" smtClean="0"/>
-              <a:t>Higher dimensions of R[x, y]k</a:t>
+              <a:t>“Copies”</a:t>
             </a:r>
             <a:endParaRPr lang="en-US" dirty="0"/>
           </a:p>
@@ -3961,215 +3918,110 @@
           <a:p>
             <a:r>
               <a:rPr lang="en-US" sz="3200" dirty="0" smtClean="0"/>
-              <a:t>We can continue this process in k = 3, 4, 5, etc.</a:t>
-            </a:r>
-          </a:p>
-          <a:p>
+              <a:t>For SL2 mod 2:</a:t>
+            </a:r>
+          </a:p>
+          <a:p>
+            <a:r>
+              <a:rPr lang="en-US" sz="3200" dirty="0" smtClean="0"/>
+              <a:t>If you look in </a:t>
+            </a:r>
+            <a:r>
+              <a:rPr lang="en-US" sz="3200" u="sng" dirty="0" smtClean="0">
+                <a:latin typeface="Calibri" panose="020F0502020204030204" pitchFamily="34" charset="0"/>
+              </a:rPr>
+              <a:t>3</a:t>
+            </a:r>
+            <a:r>
+              <a:rPr lang="en-US" sz="3200" dirty="0" smtClean="0"/>
+              <a:t>, you can find elements that behave exactly like those in </a:t>
+            </a:r>
+            <a:r>
+              <a:rPr lang="en-US" sz="3200" u="sng" dirty="0" smtClean="0"/>
+              <a:t>1</a:t>
+            </a:r>
+            <a:r>
+              <a:rPr lang="en-US" sz="3200" dirty="0" smtClean="0"/>
+              <a:t> and </a:t>
+            </a:r>
+            <a:r>
+              <a:rPr lang="en-US" sz="3200" u="sng" dirty="0" smtClean="0"/>
+              <a:t>2</a:t>
+            </a:r>
+            <a:r>
+              <a:rPr lang="en-US" sz="3200" dirty="0" smtClean="0"/>
+              <a:t> as far as their mappings go. </a:t>
+            </a:r>
             <a:endParaRPr lang="en-US" sz="3200" dirty="0"/>
           </a:p>
           <a:p>
+            <a:pPr lvl="1"/>
+            <a:r>
+              <a:rPr lang="en-US" sz="3000" dirty="0" smtClean="0"/>
+              <a:t>We call them “copies” of </a:t>
+            </a:r>
+            <a:r>
+              <a:rPr lang="en-US" sz="3000" u="sng" dirty="0" smtClean="0"/>
+              <a:t>1</a:t>
+            </a:r>
+            <a:r>
+              <a:rPr lang="en-US" sz="3000" dirty="0" smtClean="0"/>
+              <a:t> and </a:t>
+            </a:r>
+            <a:r>
+              <a:rPr lang="en-US" sz="3000" u="sng" dirty="0" smtClean="0"/>
+              <a:t>2</a:t>
+            </a:r>
+            <a:r>
+              <a:rPr lang="en-US" sz="3000" dirty="0" smtClean="0"/>
+              <a:t>. </a:t>
+            </a:r>
+          </a:p>
+          <a:p>
+            <a:pPr lvl="1"/>
+            <a:endParaRPr lang="en-US" sz="3000" dirty="0"/>
+          </a:p>
+          <a:p>
             <a:r>
               <a:rPr lang="en-US" sz="3200" dirty="0" smtClean="0"/>
-              <a:t>New notation: </a:t>
-            </a:r>
-            <a:r>
-              <a:rPr lang="en-US" sz="3200" dirty="0"/>
-              <a:t>R[x, </a:t>
+              <a:t>No matter how high the dimension, we would still find copies of </a:t>
+            </a:r>
+            <a:r>
+              <a:rPr lang="en-US" sz="3200" u="sng" dirty="0" smtClean="0"/>
+              <a:t>1</a:t>
             </a:r>
             <a:r>
               <a:rPr lang="en-US" sz="3200" dirty="0" smtClean="0"/>
-              <a:t>y]k = </a:t>
+              <a:t> and </a:t>
             </a:r>
             <a:r>
               <a:rPr lang="en-US" sz="3200" u="sng" dirty="0" smtClean="0"/>
-              <a:t>k + 1</a:t>
-            </a:r>
-          </a:p>
-          <a:p>
-            <a:endParaRPr lang="en-US" sz="3200" u="sng" dirty="0"/>
-          </a:p>
-          <a:p>
+              <a:t>2</a:t>
+            </a:r>
             <a:r>
               <a:rPr lang="en-US" sz="3200" dirty="0" smtClean="0"/>
-              <a:t>Continue the action on </a:t>
-            </a:r>
-            <a:r>
-              <a:rPr lang="en-US" sz="3200" u="sng" dirty="0" smtClean="0"/>
-              <a:t>4</a:t>
-            </a:r>
-            <a:r>
-              <a:rPr lang="en-US" sz="3200" dirty="0" smtClean="0"/>
-              <a:t>, </a:t>
-            </a:r>
-            <a:r>
-              <a:rPr lang="en-US" sz="3200" u="sng" dirty="0" smtClean="0"/>
-              <a:t>5,</a:t>
-            </a:r>
-            <a:r>
-              <a:rPr lang="en-US" sz="3200" i="1" dirty="0" smtClean="0"/>
-              <a:t> </a:t>
-            </a:r>
-            <a:r>
-              <a:rPr lang="en-US" sz="3200" i="1" u="sng" dirty="0" smtClean="0"/>
-              <a:t>6,</a:t>
-            </a:r>
-            <a:r>
-              <a:rPr lang="en-US" sz="3200" i="1" dirty="0" smtClean="0"/>
-              <a:t> etc…</a:t>
-            </a:r>
-            <a:endParaRPr lang="en-US" sz="3200" i="1" dirty="0"/>
-          </a:p>
-        </p:txBody>
-      </p:sp>
-    </p:spTree>
-    <p:extLst>
-      <p:ext uri="{BB962C8B-B14F-4D97-AF65-F5344CB8AC3E}">
-        <p14:creationId xmlns:p14="http://schemas.microsoft.com/office/powerpoint/2010/main" val="2339670299"/>
-      </p:ext>
-    </p:extLst>
-  </p:cSld>
-  <p:clrMapOvr>
-    <a:masterClrMapping/>
-  </p:clrMapOvr>
-</p:sld>
-</file>
-
-<file path=ppt/slides/slide14.xml><?xml version="1.0" encoding="utf-8"?>
-<p:sld xmlns:a="http://schemas.openxmlformats.org/drawingml/2006/main" xmlns:r="http://schemas.openxmlformats.org/officeDocument/2006/relationships" xmlns:p="http://schemas.openxmlformats.org/presentationml/2006/main">
-  <p:cSld>
-    <p:spTree>
-      <p:nvGrpSpPr>
-        <p:cNvPr id="1" name=""/>
-        <p:cNvGrpSpPr/>
-        <p:nvPr/>
-      </p:nvGrpSpPr>
-      <p:grpSpPr>
-        <a:xfrm>
-          <a:off x="0" y="0"/>
-          <a:ext cx="0" cy="0"/>
-          <a:chOff x="0" y="0"/>
-          <a:chExt cx="0" cy="0"/>
-        </a:xfrm>
-      </p:grpSpPr>
-      <p:sp>
-        <p:nvSpPr>
-          <p:cNvPr id="2" name="Title 1"/>
-          <p:cNvSpPr>
-            <a:spLocks noGrp="1"/>
-          </p:cNvSpPr>
-          <p:nvPr>
-            <p:ph type="title"/>
-          </p:nvPr>
-        </p:nvSpPr>
-        <p:spPr/>
-        <p:txBody>
-          <a:bodyPr/>
-          <a:lstStyle/>
-          <a:p>
-            <a:r>
-              <a:rPr lang="en-US" dirty="0" smtClean="0"/>
-              <a:t>Irreducibility</a:t>
-            </a:r>
-            <a:endParaRPr lang="en-US" dirty="0"/>
-          </a:p>
-        </p:txBody>
-      </p:sp>
-      <p:sp>
-        <p:nvSpPr>
-          <p:cNvPr id="3" name="Content Placeholder 2"/>
-          <p:cNvSpPr>
-            <a:spLocks noGrp="1"/>
-          </p:cNvSpPr>
-          <p:nvPr>
-            <p:ph idx="1"/>
-          </p:nvPr>
-        </p:nvSpPr>
-        <p:spPr/>
-        <p:txBody>
-          <a:bodyPr/>
-          <a:lstStyle/>
-          <a:p>
-            <a:r>
-              <a:rPr lang="en-US" dirty="0" smtClean="0"/>
-              <a:t>TODO</a:t>
-            </a:r>
-            <a:endParaRPr lang="en-US" dirty="0"/>
-          </a:p>
-        </p:txBody>
-      </p:sp>
-    </p:spTree>
-    <p:extLst>
-      <p:ext uri="{BB962C8B-B14F-4D97-AF65-F5344CB8AC3E}">
-        <p14:creationId xmlns:p14="http://schemas.microsoft.com/office/powerpoint/2010/main" val="3145239643"/>
-      </p:ext>
-    </p:extLst>
-  </p:cSld>
-  <p:clrMapOvr>
-    <a:masterClrMapping/>
-  </p:clrMapOvr>
-</p:sld>
-</file>
-
-<file path=ppt/slides/slide15.xml><?xml version="1.0" encoding="utf-8"?>
-<p:sld xmlns:a="http://schemas.openxmlformats.org/drawingml/2006/main" xmlns:r="http://schemas.openxmlformats.org/officeDocument/2006/relationships" xmlns:p="http://schemas.openxmlformats.org/presentationml/2006/main">
-  <p:cSld>
-    <p:spTree>
-      <p:nvGrpSpPr>
-        <p:cNvPr id="1" name=""/>
-        <p:cNvGrpSpPr/>
-        <p:nvPr/>
-      </p:nvGrpSpPr>
-      <p:grpSpPr>
-        <a:xfrm>
-          <a:off x="0" y="0"/>
-          <a:ext cx="0" cy="0"/>
-          <a:chOff x="0" y="0"/>
-          <a:chExt cx="0" cy="0"/>
-        </a:xfrm>
-      </p:grpSpPr>
-      <p:sp>
-        <p:nvSpPr>
-          <p:cNvPr id="2" name="Title 1"/>
-          <p:cNvSpPr>
-            <a:spLocks noGrp="1"/>
-          </p:cNvSpPr>
-          <p:nvPr>
-            <p:ph type="title"/>
-          </p:nvPr>
-        </p:nvSpPr>
-        <p:spPr/>
-        <p:txBody>
-          <a:bodyPr/>
-          <a:lstStyle/>
-          <a:p>
-            <a:r>
-              <a:rPr lang="en-US" dirty="0" smtClean="0"/>
-              <a:t>“Copies”</a:t>
-            </a:r>
-            <a:endParaRPr lang="en-US" dirty="0"/>
-          </a:p>
-        </p:txBody>
-      </p:sp>
-      <p:sp>
-        <p:nvSpPr>
-          <p:cNvPr id="3" name="Content Placeholder 2"/>
-          <p:cNvSpPr>
-            <a:spLocks noGrp="1"/>
-          </p:cNvSpPr>
-          <p:nvPr>
-            <p:ph idx="1"/>
-          </p:nvPr>
-        </p:nvSpPr>
-        <p:spPr/>
-        <p:txBody>
-          <a:bodyPr/>
-          <a:lstStyle/>
-          <a:p>
-            <a:r>
-              <a:rPr lang="en-US" dirty="0" smtClean="0"/>
-              <a:t>TODO</a:t>
-            </a:r>
-            <a:endParaRPr lang="en-US" dirty="0"/>
+              <a:t>. </a:t>
+            </a:r>
+          </a:p>
+          <a:p>
+            <a:pPr lvl="1"/>
+            <a:r>
+              <a:rPr lang="en-US" sz="3000" u="sng" dirty="0" smtClean="0"/>
+              <a:t>1</a:t>
+            </a:r>
+            <a:r>
+              <a:rPr lang="en-US" sz="3000" dirty="0" smtClean="0"/>
+              <a:t> and </a:t>
+            </a:r>
+            <a:r>
+              <a:rPr lang="en-US" sz="3000" u="sng" dirty="0" smtClean="0"/>
+              <a:t>2</a:t>
+            </a:r>
+            <a:r>
+              <a:rPr lang="en-US" sz="3000" dirty="0" smtClean="0"/>
+              <a:t> are irreducible (contain no copies) in SL2 mod 2</a:t>
+            </a:r>
+            <a:endParaRPr lang="en-US" sz="3000" u="sng" dirty="0"/>
           </a:p>
         </p:txBody>
       </p:sp>
@@ -4186,7 +4038,7 @@
 </p:sld>
 </file>
 
-<file path=ppt/slides/slide16.xml><?xml version="1.0" encoding="utf-8"?>
+<file path=ppt/slides/slide14.xml><?xml version="1.0" encoding="utf-8"?>
 <p:sld xmlns:a="http://schemas.openxmlformats.org/drawingml/2006/main" xmlns:r="http://schemas.openxmlformats.org/officeDocument/2006/relationships" xmlns:p="http://schemas.openxmlformats.org/presentationml/2006/main">
   <p:cSld>
     <p:spTree>
@@ -4265,6 +4117,293 @@
 </p:sld>
 </file>
 
+<file path=ppt/slides/slide15.xml><?xml version="1.0" encoding="utf-8"?>
+<p:sld xmlns:a="http://schemas.openxmlformats.org/drawingml/2006/main" xmlns:r="http://schemas.openxmlformats.org/officeDocument/2006/relationships" xmlns:p="http://schemas.openxmlformats.org/presentationml/2006/main">
+  <p:cSld>
+    <p:spTree>
+      <p:nvGrpSpPr>
+        <p:cNvPr id="1" name=""/>
+        <p:cNvGrpSpPr/>
+        <p:nvPr/>
+      </p:nvGrpSpPr>
+      <p:grpSpPr>
+        <a:xfrm>
+          <a:off x="0" y="0"/>
+          <a:ext cx="0" cy="0"/>
+          <a:chOff x="0" y="0"/>
+          <a:chExt cx="0" cy="0"/>
+        </a:xfrm>
+      </p:grpSpPr>
+      <p:sp>
+        <p:nvSpPr>
+          <p:cNvPr id="2" name="Title 1"/>
+          <p:cNvSpPr>
+            <a:spLocks noGrp="1"/>
+          </p:cNvSpPr>
+          <p:nvPr>
+            <p:ph type="title"/>
+          </p:nvPr>
+        </p:nvSpPr>
+        <p:spPr/>
+        <p:txBody>
+          <a:bodyPr/>
+          <a:lstStyle/>
+          <a:p>
+            <a:r>
+              <a:rPr lang="en-US" dirty="0" smtClean="0"/>
+              <a:t>SL2mod 2 </a:t>
+            </a:r>
+            <a:endParaRPr lang="en-US" dirty="0"/>
+          </a:p>
+        </p:txBody>
+      </p:sp>
+      <p:sp>
+        <p:nvSpPr>
+          <p:cNvPr id="3" name="Content Placeholder 2"/>
+          <p:cNvSpPr>
+            <a:spLocks noGrp="1"/>
+          </p:cNvSpPr>
+          <p:nvPr>
+            <p:ph idx="1"/>
+          </p:nvPr>
+        </p:nvSpPr>
+        <p:spPr/>
+        <p:txBody>
+          <a:bodyPr/>
+          <a:lstStyle/>
+          <a:p>
+            <a:r>
+              <a:rPr lang="en-US" sz="3200" dirty="0" smtClean="0"/>
+              <a:t>Define formulas for each row in the table. For row </a:t>
+            </a:r>
+            <a:r>
+              <a:rPr lang="en-US" sz="3200" u="sng" dirty="0" smtClean="0"/>
+              <a:t>h</a:t>
+            </a:r>
+            <a:r>
+              <a:rPr lang="en-US" sz="3200" dirty="0" smtClean="0"/>
+              <a:t>, take h mod 3: </a:t>
+            </a:r>
+          </a:p>
+          <a:p>
+            <a:endParaRPr lang="en-US" sz="3200" dirty="0"/>
+          </a:p>
+          <a:p>
+            <a:endParaRPr lang="en-US" sz="3200" dirty="0" smtClean="0"/>
+          </a:p>
+          <a:p>
+            <a:endParaRPr lang="en-US" sz="3200" dirty="0"/>
+          </a:p>
+          <a:p>
+            <a:endParaRPr lang="en-US" dirty="0"/>
+          </a:p>
+        </p:txBody>
+      </p:sp>
+      <p:pic>
+        <p:nvPicPr>
+          <p:cNvPr id="5" name="Picture 4"/>
+          <p:cNvPicPr>
+            <a:picLocks noChangeAspect="1"/>
+          </p:cNvPicPr>
+          <p:nvPr/>
+        </p:nvPicPr>
+        <p:blipFill>
+          <a:blip r:embed="rId2"/>
+          <a:stretch>
+            <a:fillRect/>
+          </a:stretch>
+        </p:blipFill>
+        <p:spPr>
+          <a:xfrm>
+            <a:off x="4414129" y="2914650"/>
+            <a:ext cx="6225477" cy="3070098"/>
+          </a:xfrm>
+          <a:prstGeom prst="rect">
+            <a:avLst/>
+          </a:prstGeom>
+        </p:spPr>
+      </p:pic>
+    </p:spTree>
+    <p:extLst>
+      <p:ext uri="{BB962C8B-B14F-4D97-AF65-F5344CB8AC3E}">
+        <p14:creationId xmlns:p14="http://schemas.microsoft.com/office/powerpoint/2010/main" val="2068961017"/>
+      </p:ext>
+    </p:extLst>
+  </p:cSld>
+  <p:clrMapOvr>
+    <a:masterClrMapping/>
+  </p:clrMapOvr>
+</p:sld>
+</file>
+
+<file path=ppt/slides/slide16.xml><?xml version="1.0" encoding="utf-8"?>
+<p:sld xmlns:a="http://schemas.openxmlformats.org/drawingml/2006/main" xmlns:r="http://schemas.openxmlformats.org/officeDocument/2006/relationships" xmlns:p="http://schemas.openxmlformats.org/presentationml/2006/main">
+  <p:cSld>
+    <p:spTree>
+      <p:nvGrpSpPr>
+        <p:cNvPr id="1" name=""/>
+        <p:cNvGrpSpPr/>
+        <p:nvPr/>
+      </p:nvGrpSpPr>
+      <p:grpSpPr>
+        <a:xfrm>
+          <a:off x="0" y="0"/>
+          <a:ext cx="0" cy="0"/>
+          <a:chOff x="0" y="0"/>
+          <a:chExt cx="0" cy="0"/>
+        </a:xfrm>
+      </p:grpSpPr>
+      <p:sp>
+        <p:nvSpPr>
+          <p:cNvPr id="2" name="Title 1"/>
+          <p:cNvSpPr>
+            <a:spLocks noGrp="1"/>
+          </p:cNvSpPr>
+          <p:nvPr>
+            <p:ph type="title"/>
+          </p:nvPr>
+        </p:nvSpPr>
+        <p:spPr/>
+        <p:txBody>
+          <a:bodyPr/>
+          <a:lstStyle/>
+          <a:p>
+            <a:r>
+              <a:rPr lang="en-US" dirty="0" smtClean="0"/>
+              <a:t>SL2 mod 3 and 5</a:t>
+            </a:r>
+            <a:endParaRPr lang="en-US" dirty="0"/>
+          </a:p>
+        </p:txBody>
+      </p:sp>
+      <p:sp>
+        <p:nvSpPr>
+          <p:cNvPr id="3" name="Content Placeholder 2"/>
+          <p:cNvSpPr>
+            <a:spLocks noGrp="1"/>
+          </p:cNvSpPr>
+          <p:nvPr>
+            <p:ph idx="1"/>
+          </p:nvPr>
+        </p:nvSpPr>
+        <p:spPr/>
+        <p:txBody>
+          <a:bodyPr/>
+          <a:lstStyle/>
+          <a:p>
+            <a:r>
+              <a:rPr lang="en-US" dirty="0" smtClean="0"/>
+              <a:t>SL2 mod 3: Take h mod 4: </a:t>
+            </a:r>
+          </a:p>
+          <a:p>
+            <a:endParaRPr lang="en-US" dirty="0"/>
+          </a:p>
+          <a:p>
+            <a:pPr marL="0" indent="0">
+              <a:buNone/>
+            </a:pPr>
+            <a:endParaRPr lang="en-US" dirty="0"/>
+          </a:p>
+          <a:p>
+            <a:pPr marL="0" indent="0">
+              <a:buNone/>
+            </a:pPr>
+            <a:endParaRPr lang="en-US" dirty="0" smtClean="0"/>
+          </a:p>
+          <a:p>
+            <a:pPr marL="0" indent="0">
+              <a:buNone/>
+            </a:pPr>
+            <a:endParaRPr lang="en-US" dirty="0"/>
+          </a:p>
+          <a:p>
+            <a:pPr marL="0" indent="0">
+              <a:buNone/>
+            </a:pPr>
+            <a:endParaRPr lang="en-US" dirty="0" smtClean="0"/>
+          </a:p>
+          <a:p>
+            <a:pPr marL="0" indent="0">
+              <a:buNone/>
+            </a:pPr>
+            <a:r>
+              <a:rPr lang="en-US" dirty="0" smtClean="0"/>
+              <a:t>SL2 mod 5:  take h mod 6: </a:t>
+            </a:r>
+          </a:p>
+          <a:p>
+            <a:pPr marL="0" indent="0">
+              <a:buNone/>
+            </a:pPr>
+            <a:endParaRPr lang="en-US" dirty="0" smtClean="0"/>
+          </a:p>
+          <a:p>
+            <a:endParaRPr lang="en-US" dirty="0"/>
+          </a:p>
+        </p:txBody>
+      </p:sp>
+      <p:pic>
+        <p:nvPicPr>
+          <p:cNvPr id="6" name="Picture 5"/>
+          <p:cNvPicPr>
+            <a:picLocks noChangeAspect="1"/>
+          </p:cNvPicPr>
+          <p:nvPr/>
+        </p:nvPicPr>
+        <p:blipFill>
+          <a:blip r:embed="rId2"/>
+          <a:stretch>
+            <a:fillRect/>
+          </a:stretch>
+        </p:blipFill>
+        <p:spPr>
+          <a:xfrm>
+            <a:off x="3869268" y="2052637"/>
+            <a:ext cx="4324350" cy="1685925"/>
+          </a:xfrm>
+          <a:prstGeom prst="rect">
+            <a:avLst/>
+          </a:prstGeom>
+        </p:spPr>
+      </p:pic>
+      <p:pic>
+        <p:nvPicPr>
+          <p:cNvPr id="8" name="Picture 7"/>
+          <p:cNvPicPr>
+            <a:picLocks noChangeAspect="1"/>
+          </p:cNvPicPr>
+          <p:nvPr/>
+        </p:nvPicPr>
+        <p:blipFill>
+          <a:blip r:embed="rId3"/>
+          <a:stretch>
+            <a:fillRect/>
+          </a:stretch>
+        </p:blipFill>
+        <p:spPr>
+          <a:xfrm>
+            <a:off x="3869268" y="4458195"/>
+            <a:ext cx="5481734" cy="2209305"/>
+          </a:xfrm>
+          <a:prstGeom prst="rect">
+            <a:avLst/>
+          </a:prstGeom>
+        </p:spPr>
+      </p:pic>
+    </p:spTree>
+    <p:extLst>
+      <p:ext uri="{BB962C8B-B14F-4D97-AF65-F5344CB8AC3E}">
+        <p14:creationId xmlns:p14="http://schemas.microsoft.com/office/powerpoint/2010/main" val="2340849476"/>
+      </p:ext>
+    </p:extLst>
+  </p:cSld>
+  <p:clrMapOvr>
+    <a:masterClrMapping/>
+  </p:clrMapOvr>
+</p:sld>
+</file>
+
 <file path=ppt/slides/slide17.xml><?xml version="1.0" encoding="utf-8"?>
 <p:sld xmlns:a="http://schemas.openxmlformats.org/drawingml/2006/main" xmlns:r="http://schemas.openxmlformats.org/officeDocument/2006/relationships" xmlns:p="http://schemas.openxmlformats.org/presentationml/2006/main">
   <p:cSld>
@@ -4294,14 +4433,16 @@
         </p:nvSpPr>
         <p:spPr/>
         <p:txBody>
-          <a:bodyPr/>
-          <a:lstStyle/>
-          <a:p>
-            <a:r>
-              <a:rPr lang="en-US" dirty="0" smtClean="0"/>
-              <a:t>SL2mod 2 </a:t>
-            </a:r>
-            <a:endParaRPr lang="en-US" dirty="0"/>
+          <a:bodyPr>
+            <a:normAutofit/>
+          </a:bodyPr>
+          <a:lstStyle/>
+          <a:p>
+            <a:r>
+              <a:rPr lang="en-US" sz="3500" dirty="0" smtClean="0"/>
+              <a:t>Generalizations in SL2 mod n</a:t>
+            </a:r>
+            <a:endParaRPr lang="en-US" sz="3500" dirty="0"/>
           </a:p>
         </p:txBody>
       </p:sp>
@@ -4322,35 +4463,70 @@
           <a:p>
             <a:r>
               <a:rPr lang="en-US" sz="3200" dirty="0" smtClean="0"/>
-              <a:t>Define formulas for each row in the table. For row </a:t>
+              <a:t>For SL2 mod n, </a:t>
             </a:r>
             <a:r>
               <a:rPr lang="en-US" sz="3200" u="sng" dirty="0" smtClean="0"/>
-              <a:t>h</a:t>
+              <a:t>1</a:t>
             </a:r>
             <a:r>
               <a:rPr lang="en-US" sz="3200" dirty="0" smtClean="0"/>
-              <a:t>, take h mod 4: </a:t>
-            </a:r>
-          </a:p>
-          <a:p>
+              <a:t>…. </a:t>
+            </a:r>
+            <a:r>
+              <a:rPr lang="en-US" sz="3200" u="sng" dirty="0" smtClean="0"/>
+              <a:t>n</a:t>
+            </a:r>
+            <a:r>
+              <a:rPr lang="en-US" sz="3200" dirty="0" smtClean="0"/>
+              <a:t> are irreducible!</a:t>
+            </a:r>
+          </a:p>
+          <a:p>
+            <a:pPr lvl="1"/>
+            <a:r>
+              <a:rPr lang="en-US" sz="3200" dirty="0" smtClean="0"/>
+              <a:t>Link between SL2 mod n and R[x, y]</a:t>
+            </a:r>
+            <a:r>
+              <a:rPr lang="en-US" sz="2800" dirty="0" smtClean="0"/>
+              <a:t>k</a:t>
+            </a:r>
+          </a:p>
+          <a:p>
+            <a:pPr marL="502920" lvl="1" indent="0">
+              <a:buNone/>
+            </a:pPr>
+            <a:endParaRPr lang="en-US" sz="3200" dirty="0" smtClean="0"/>
+          </a:p>
+          <a:p>
+            <a:r>
+              <a:rPr lang="en-US" sz="3400" dirty="0" smtClean="0"/>
+              <a:t>Every table has a pattern of period n+1.</a:t>
+            </a:r>
+          </a:p>
+          <a:p>
+            <a:pPr marL="0" indent="0">
+              <a:buNone/>
+            </a:pPr>
+            <a:r>
+              <a:rPr lang="en-US" sz="3400" dirty="0" smtClean="0"/>
+              <a:t> </a:t>
+            </a:r>
+          </a:p>
+          <a:p>
+            <a:r>
+              <a:rPr lang="en-US" sz="3200" dirty="0" smtClean="0"/>
+              <a:t>Every table can be created with entries including combinations of the ceiling and floor of h/(n+1). </a:t>
+            </a:r>
             <a:endParaRPr lang="en-US" sz="3200" dirty="0"/>
-          </a:p>
-          <a:p>
-            <a:endParaRPr lang="en-US" sz="3200" dirty="0" smtClean="0"/>
-          </a:p>
-          <a:p>
-            <a:endParaRPr lang="en-US" sz="3200" dirty="0"/>
-          </a:p>
-          <a:p>
-            <a:endParaRPr lang="en-US" dirty="0"/>
           </a:p>
         </p:txBody>
       </p:sp>
     </p:spTree>
     <p:extLst>
       <p:ext uri="{BB962C8B-B14F-4D97-AF65-F5344CB8AC3E}">
-        <p14:creationId xmlns:p14="http://schemas.microsoft.com/office/powerpoint/2010/main" val="2068961017"/>
+        <p14:creationId xmlns:p14="http://schemas.microsoft.com/office/powerpoint/2010/main" val="2295019697"/>
       </p:ext>
     </p:extLst>
   </p:cSld>
@@ -4394,7 +4570,7 @@
           <a:p>
             <a:r>
               <a:rPr lang="en-US" dirty="0" smtClean="0"/>
-              <a:t>SL2 mod 3 and 5</a:t>
+              <a:t>Future work</a:t>
             </a:r>
             <a:endParaRPr lang="en-US" dirty="0"/>
           </a:p>
@@ -4412,241 +4588,42 @@
         </p:nvSpPr>
         <p:spPr/>
         <p:txBody>
-          <a:bodyPr/>
-          <a:lstStyle/>
-          <a:p>
-            <a:r>
-              <a:rPr lang="en-US" dirty="0" smtClean="0"/>
-              <a:t>SL2 mod 3: Take h mod 4: </a:t>
-            </a:r>
-          </a:p>
-          <a:p>
-            <a:endParaRPr lang="en-US" dirty="0"/>
-          </a:p>
-          <a:p>
-            <a:pPr marL="0" indent="0">
+          <a:bodyPr>
+            <a:normAutofit/>
+          </a:bodyPr>
+          <a:lstStyle/>
+          <a:p>
+            <a:r>
+              <a:rPr lang="en-US" sz="3200" dirty="0" smtClean="0"/>
+              <a:t>Future research possibilities: </a:t>
+            </a:r>
+          </a:p>
+          <a:p>
+            <a:pPr lvl="1"/>
+            <a:r>
+              <a:rPr lang="en-US" sz="3200" dirty="0" smtClean="0"/>
+              <a:t>Generalize a formula for any table in SL2 mod n</a:t>
+            </a:r>
+          </a:p>
+          <a:p>
+            <a:pPr marL="502920" lvl="1" indent="0">
               <a:buNone/>
             </a:pPr>
-            <a:endParaRPr lang="en-US" dirty="0"/>
-          </a:p>
-          <a:p>
-            <a:pPr marL="0" indent="0">
-              <a:buNone/>
-            </a:pPr>
-            <a:endParaRPr lang="en-US" dirty="0" smtClean="0"/>
-          </a:p>
-          <a:p>
-            <a:pPr marL="0" indent="0">
-              <a:buNone/>
-            </a:pPr>
-            <a:endParaRPr lang="en-US" dirty="0"/>
-          </a:p>
-          <a:p>
-            <a:pPr marL="0" indent="0">
-              <a:buNone/>
-            </a:pPr>
-            <a:endParaRPr lang="en-US" dirty="0" smtClean="0"/>
-          </a:p>
-          <a:p>
-            <a:pPr marL="0" indent="0">
-              <a:buNone/>
-            </a:pPr>
-            <a:r>
-              <a:rPr lang="en-US" dirty="0" smtClean="0"/>
-              <a:t>SL2 mod 5:  take h mod 6: </a:t>
-            </a:r>
-          </a:p>
-          <a:p>
-            <a:pPr marL="0" indent="0">
-              <a:buNone/>
-            </a:pPr>
-            <a:endParaRPr lang="en-US" dirty="0" smtClean="0"/>
-          </a:p>
-          <a:p>
-            <a:endParaRPr lang="en-US" dirty="0"/>
-          </a:p>
-        </p:txBody>
-      </p:sp>
-      <p:pic>
-        <p:nvPicPr>
-          <p:cNvPr id="6" name="Picture 5"/>
-          <p:cNvPicPr>
-            <a:picLocks noChangeAspect="1"/>
-          </p:cNvPicPr>
-          <p:nvPr/>
-        </p:nvPicPr>
-        <p:blipFill>
-          <a:blip r:embed="rId2"/>
-          <a:stretch>
-            <a:fillRect/>
-          </a:stretch>
-        </p:blipFill>
-        <p:spPr>
-          <a:xfrm>
-            <a:off x="3869268" y="2052637"/>
-            <a:ext cx="4324350" cy="1685925"/>
-          </a:xfrm>
-          <a:prstGeom prst="rect">
-            <a:avLst/>
-          </a:prstGeom>
-        </p:spPr>
-      </p:pic>
-      <p:pic>
-        <p:nvPicPr>
-          <p:cNvPr id="7" name="Picture 6"/>
-          <p:cNvPicPr>
-            <a:picLocks noChangeAspect="1"/>
-          </p:cNvPicPr>
-          <p:nvPr/>
-        </p:nvPicPr>
-        <p:blipFill>
-          <a:blip r:embed="rId3"/>
-          <a:stretch>
-            <a:fillRect/>
-          </a:stretch>
-        </p:blipFill>
-        <p:spPr>
-          <a:xfrm>
-            <a:off x="3869268" y="4462653"/>
-            <a:ext cx="6153150" cy="2295525"/>
-          </a:xfrm>
-          <a:prstGeom prst="rect">
-            <a:avLst/>
-          </a:prstGeom>
-        </p:spPr>
-      </p:pic>
+            <a:endParaRPr lang="en-US" sz="3200" dirty="0" smtClean="0"/>
+          </a:p>
+          <a:p>
+            <a:pPr lvl="1"/>
+            <a:r>
+              <a:rPr lang="en-US" sz="3200" dirty="0" smtClean="0"/>
+              <a:t>Bigger matrices/polynomials in more variables? </a:t>
+            </a:r>
+          </a:p>
+        </p:txBody>
+      </p:sp>
     </p:spTree>
     <p:extLst>
       <p:ext uri="{BB962C8B-B14F-4D97-AF65-F5344CB8AC3E}">
-        <p14:creationId xmlns:p14="http://schemas.microsoft.com/office/powerpoint/2010/main" val="2340849476"/>
-      </p:ext>
-    </p:extLst>
-  </p:cSld>
-  <p:clrMapOvr>
-    <a:masterClrMapping/>
-  </p:clrMapOvr>
-</p:sld>
-</file>
-
-<file path=ppt/slides/slide19.xml><?xml version="1.0" encoding="utf-8"?>
-<p:sld xmlns:a="http://schemas.openxmlformats.org/drawingml/2006/main" xmlns:r="http://schemas.openxmlformats.org/officeDocument/2006/relationships" xmlns:p="http://schemas.openxmlformats.org/presentationml/2006/main">
-  <p:cSld>
-    <p:spTree>
-      <p:nvGrpSpPr>
-        <p:cNvPr id="1" name=""/>
-        <p:cNvGrpSpPr/>
-        <p:nvPr/>
-      </p:nvGrpSpPr>
-      <p:grpSpPr>
-        <a:xfrm>
-          <a:off x="0" y="0"/>
-          <a:ext cx="0" cy="0"/>
-          <a:chOff x="0" y="0"/>
-          <a:chExt cx="0" cy="0"/>
-        </a:xfrm>
-      </p:grpSpPr>
-      <p:sp>
-        <p:nvSpPr>
-          <p:cNvPr id="2" name="Title 1"/>
-          <p:cNvSpPr>
-            <a:spLocks noGrp="1"/>
-          </p:cNvSpPr>
-          <p:nvPr>
-            <p:ph type="title"/>
-          </p:nvPr>
-        </p:nvSpPr>
-        <p:spPr/>
-        <p:txBody>
-          <a:bodyPr>
-            <a:normAutofit/>
-          </a:bodyPr>
-          <a:lstStyle/>
-          <a:p>
-            <a:r>
-              <a:rPr lang="en-US" sz="3500" dirty="0" smtClean="0"/>
-              <a:t>Generalizations in SL2 mod n</a:t>
-            </a:r>
-            <a:endParaRPr lang="en-US" sz="3500" dirty="0"/>
-          </a:p>
-        </p:txBody>
-      </p:sp>
-      <p:sp>
-        <p:nvSpPr>
-          <p:cNvPr id="3" name="Content Placeholder 2"/>
-          <p:cNvSpPr>
-            <a:spLocks noGrp="1"/>
-          </p:cNvSpPr>
-          <p:nvPr>
-            <p:ph idx="1"/>
-          </p:nvPr>
-        </p:nvSpPr>
-        <p:spPr/>
-        <p:txBody>
-          <a:bodyPr/>
-          <a:lstStyle/>
-          <a:p>
-            <a:r>
-              <a:rPr lang="en-US" sz="3200" dirty="0" smtClean="0"/>
-              <a:t>For SL2 mod n, </a:t>
-            </a:r>
-            <a:r>
-              <a:rPr lang="en-US" sz="3200" u="sng" dirty="0" smtClean="0"/>
-              <a:t>1</a:t>
-            </a:r>
-            <a:r>
-              <a:rPr lang="en-US" sz="3200" dirty="0" smtClean="0"/>
-              <a:t>…. </a:t>
-            </a:r>
-            <a:r>
-              <a:rPr lang="en-US" sz="3200" u="sng" dirty="0" smtClean="0"/>
-              <a:t>n</a:t>
-            </a:r>
-            <a:r>
-              <a:rPr lang="en-US" sz="3200" dirty="0" smtClean="0"/>
-              <a:t> are irreducible!</a:t>
-            </a:r>
-          </a:p>
-          <a:p>
-            <a:pPr lvl="1"/>
-            <a:r>
-              <a:rPr lang="en-US" sz="3200" dirty="0" smtClean="0"/>
-              <a:t>Link between SL2 mod n and R[x, y]k</a:t>
-            </a:r>
-          </a:p>
-          <a:p>
-            <a:pPr marL="502920" lvl="1" indent="0">
-              <a:buNone/>
-            </a:pPr>
-            <a:endParaRPr lang="en-US" sz="3200" dirty="0" smtClean="0"/>
-          </a:p>
-          <a:p>
-            <a:r>
-              <a:rPr lang="en-US" sz="3400" dirty="0" smtClean="0"/>
-              <a:t>Every table has a pattern of period n+1.</a:t>
-            </a:r>
-          </a:p>
-          <a:p>
-            <a:pPr marL="0" indent="0">
-              <a:buNone/>
-            </a:pPr>
-            <a:r>
-              <a:rPr lang="en-US" sz="3400" dirty="0" smtClean="0"/>
-              <a:t> </a:t>
-            </a:r>
-          </a:p>
-          <a:p>
-            <a:r>
-              <a:rPr lang="en-US" sz="3200" dirty="0" smtClean="0"/>
-              <a:t>Every table can be created with combinations of and  the ceiling and floor of h/(n+1). </a:t>
-            </a:r>
-            <a:endParaRPr lang="en-US" sz="3200" dirty="0"/>
-          </a:p>
-        </p:txBody>
-      </p:sp>
-    </p:spTree>
-    <p:extLst>
-      <p:ext uri="{BB962C8B-B14F-4D97-AF65-F5344CB8AC3E}">
-        <p14:creationId xmlns:p14="http://schemas.microsoft.com/office/powerpoint/2010/main" val="2295019697"/>
+        <p14:creationId xmlns:p14="http://schemas.microsoft.com/office/powerpoint/2010/main" val="1681778403"/>
       </p:ext>
     </p:extLst>
   </p:cSld>
@@ -4728,90 +4705,6 @@
 </p:sld>
 </file>
 
-<file path=ppt/slides/slide20.xml><?xml version="1.0" encoding="utf-8"?>
-<p:sld xmlns:a="http://schemas.openxmlformats.org/drawingml/2006/main" xmlns:r="http://schemas.openxmlformats.org/officeDocument/2006/relationships" xmlns:p="http://schemas.openxmlformats.org/presentationml/2006/main">
-  <p:cSld>
-    <p:spTree>
-      <p:nvGrpSpPr>
-        <p:cNvPr id="1" name=""/>
-        <p:cNvGrpSpPr/>
-        <p:nvPr/>
-      </p:nvGrpSpPr>
-      <p:grpSpPr>
-        <a:xfrm>
-          <a:off x="0" y="0"/>
-          <a:ext cx="0" cy="0"/>
-          <a:chOff x="0" y="0"/>
-          <a:chExt cx="0" cy="0"/>
-        </a:xfrm>
-      </p:grpSpPr>
-      <p:sp>
-        <p:nvSpPr>
-          <p:cNvPr id="2" name="Title 1"/>
-          <p:cNvSpPr>
-            <a:spLocks noGrp="1"/>
-          </p:cNvSpPr>
-          <p:nvPr>
-            <p:ph type="title"/>
-          </p:nvPr>
-        </p:nvSpPr>
-        <p:spPr/>
-        <p:txBody>
-          <a:bodyPr/>
-          <a:lstStyle/>
-          <a:p>
-            <a:r>
-              <a:rPr lang="en-US" dirty="0" smtClean="0"/>
-              <a:t>Future work</a:t>
-            </a:r>
-            <a:endParaRPr lang="en-US" dirty="0"/>
-          </a:p>
-        </p:txBody>
-      </p:sp>
-      <p:sp>
-        <p:nvSpPr>
-          <p:cNvPr id="3" name="Content Placeholder 2"/>
-          <p:cNvSpPr>
-            <a:spLocks noGrp="1"/>
-          </p:cNvSpPr>
-          <p:nvPr>
-            <p:ph idx="1"/>
-          </p:nvPr>
-        </p:nvSpPr>
-        <p:spPr/>
-        <p:txBody>
-          <a:bodyPr>
-            <a:normAutofit/>
-          </a:bodyPr>
-          <a:lstStyle/>
-          <a:p>
-            <a:r>
-              <a:rPr lang="en-US" sz="3200" dirty="0" smtClean="0"/>
-              <a:t>Future research possibilities: </a:t>
-            </a:r>
-          </a:p>
-          <a:p>
-            <a:pPr lvl="1"/>
-            <a:r>
-              <a:rPr lang="en-US" sz="3200" dirty="0" smtClean="0"/>
-              <a:t>Generalize a formula for any table in SL2 mod n</a:t>
-            </a:r>
-          </a:p>
-        </p:txBody>
-      </p:sp>
-    </p:spTree>
-    <p:extLst>
-      <p:ext uri="{BB962C8B-B14F-4D97-AF65-F5344CB8AC3E}">
-        <p14:creationId xmlns:p14="http://schemas.microsoft.com/office/powerpoint/2010/main" val="1681778403"/>
-      </p:ext>
-    </p:extLst>
-  </p:cSld>
-  <p:clrMapOvr>
-    <a:masterClrMapping/>
-  </p:clrMapOvr>
-</p:sld>
-</file>
-
 <file path=ppt/slides/slide3.xml><?xml version="1.0" encoding="utf-8"?>
 <p:sld xmlns:a="http://schemas.openxmlformats.org/drawingml/2006/main" xmlns:r="http://schemas.openxmlformats.org/officeDocument/2006/relationships" xmlns:p="http://schemas.openxmlformats.org/presentationml/2006/main">
   <p:cSld>
@@ -4883,7 +4776,7 @@
           <a:p>
             <a:r>
               <a:rPr lang="en-US" sz="3200" dirty="0" smtClean="0"/>
-              <a:t>Can be defined over any commutative ring with unity</a:t>
+              <a:t>Defined over commutative ring with unity</a:t>
             </a:r>
           </a:p>
           <a:p>
@@ -5007,7 +4900,15 @@
             </a:r>
             <a:r>
               <a:rPr lang="en-US" sz="3200" dirty="0" smtClean="0"/>
-              <a:t>]n is the ring of polynomials…</a:t>
+              <a:t>]</a:t>
+            </a:r>
+            <a:r>
+              <a:rPr lang="en-US" sz="2800" dirty="0" smtClean="0"/>
+              <a:t>k</a:t>
+            </a:r>
+            <a:r>
+              <a:rPr lang="en-US" sz="3200" dirty="0" smtClean="0"/>
+              <a:t> is the ring of polynomials…</a:t>
             </a:r>
           </a:p>
           <a:p>
@@ -5021,6 +4922,13 @@
             <a:pPr lvl="1"/>
             <a:r>
               <a:rPr lang="en-US" sz="3200" dirty="0" smtClean="0"/>
+              <a:t>Degree k</a:t>
+            </a:r>
+          </a:p>
+          <a:p>
+            <a:pPr lvl="1"/>
+            <a:r>
+              <a:rPr lang="en-US" sz="3200" dirty="0" smtClean="0"/>
               <a:t>Coefficients in R = Z mod n</a:t>
             </a:r>
           </a:p>
@@ -5030,19 +4938,31 @@
           <a:p>
             <a:r>
               <a:rPr lang="en-US" sz="3200" dirty="0" smtClean="0"/>
-              <a:t>Has form ax</a:t>
+              <a:t>Has form </a:t>
+            </a:r>
+            <a:r>
+              <a:rPr lang="en-US" sz="3200" dirty="0" err="1" smtClean="0"/>
+              <a:t>ax</a:t>
+            </a:r>
+            <a:r>
+              <a:rPr lang="en-US" sz="3200" baseline="30000" dirty="0" err="1" smtClean="0"/>
+              <a:t>k</a:t>
+            </a:r>
+            <a:r>
+              <a:rPr lang="en-US" sz="3200" dirty="0" smtClean="0"/>
+              <a:t> </a:t>
+            </a:r>
+            <a:r>
+              <a:rPr lang="en-US" sz="3200" dirty="0" err="1" smtClean="0"/>
+              <a:t>y</a:t>
+            </a:r>
+            <a:r>
+              <a:rPr lang="en-US" sz="3200" baseline="30000" dirty="0" err="1" smtClean="0"/>
+              <a:t>k</a:t>
             </a:r>
             <a:r>
               <a:rPr lang="en-US" sz="3200" baseline="30000" dirty="0" smtClean="0"/>
-              <a:t>n</a:t>
-            </a:r>
-            <a:r>
-              <a:rPr lang="en-US" sz="3200" dirty="0" smtClean="0"/>
-              <a:t> y</a:t>
-            </a:r>
-            <a:r>
-              <a:rPr lang="en-US" sz="3200" baseline="30000" dirty="0" smtClean="0"/>
-              <a:t>n </a:t>
+              <a:t> </a:t>
             </a:r>
             <a:r>
               <a:rPr lang="en-US" sz="3200" dirty="0" smtClean="0"/>
@@ -5054,20 +4974,24 @@
           </a:p>
           <a:p>
             <a:r>
-              <a:rPr lang="en-US" sz="3200" dirty="0"/>
+              <a:rPr lang="en-US" sz="3200" dirty="0" smtClean="0"/>
               <a:t>R[</a:t>
             </a:r>
             <a:r>
-              <a:rPr lang="en-US" sz="3200" dirty="0" err="1"/>
+              <a:rPr lang="en-US" sz="3200" dirty="0" err="1" smtClean="0"/>
               <a:t>x,y</a:t>
             </a:r>
             <a:r>
-              <a:rPr lang="en-US" sz="3200" dirty="0"/>
-              <a:t>]n </a:t>
-            </a:r>
-            <a:r>
               <a:rPr lang="en-US" sz="3200" dirty="0" smtClean="0"/>
-              <a:t>contains n</a:t>
+              <a:t>]</a:t>
+            </a:r>
+            <a:r>
+              <a:rPr lang="en-US" sz="2800" dirty="0" smtClean="0"/>
+              <a:t>k</a:t>
+            </a:r>
+            <a:r>
+              <a:rPr lang="en-US" sz="3200" dirty="0" smtClean="0"/>
+              <a:t> contains n</a:t>
             </a:r>
             <a:r>
               <a:rPr lang="en-US" sz="3200" baseline="30000" dirty="0" smtClean="0"/>
@@ -5181,7 +5105,7 @@
           <a:p>
             <a:r>
               <a:rPr lang="en-US" sz="3500" dirty="0" smtClean="0"/>
-              <a:t>R = Integers mod 2, n = 2</a:t>
+              <a:t>R = Integers mod 2, k = 2</a:t>
             </a:r>
           </a:p>
           <a:p>
@@ -5217,7 +5141,7 @@
               <a:rPr lang="en-US" sz="2600" dirty="0">
                 <a:latin typeface="Calibri" panose="020F0502020204030204" pitchFamily="34" charset="0"/>
               </a:rPr>
-              <a:t>0x2 + 0xy + 0y</a:t>
+              <a:t>0x</a:t>
             </a:r>
             <a:r>
               <a:rPr lang="en-US" sz="2600" baseline="30000" dirty="0">
@@ -5229,6 +5153,18 @@
               <a:rPr lang="en-US" sz="2600" dirty="0">
                 <a:latin typeface="Calibri" panose="020F0502020204030204" pitchFamily="34" charset="0"/>
               </a:rPr>
+              <a:t> + 0xy + 0y</a:t>
+            </a:r>
+            <a:r>
+              <a:rPr lang="en-US" sz="2600" baseline="30000" dirty="0">
+                <a:latin typeface="Calibri" panose="020F0502020204030204" pitchFamily="34" charset="0"/>
+              </a:rPr>
+              <a:t>2</a:t>
+            </a:r>
+            <a:r>
+              <a:rPr lang="en-US" sz="2600" dirty="0">
+                <a:latin typeface="Calibri" panose="020F0502020204030204" pitchFamily="34" charset="0"/>
+              </a:rPr>
               <a:t> = </a:t>
             </a:r>
             <a:r>
@@ -5256,7 +5192,19 @@
               <a:rPr lang="en-US" sz="2600" dirty="0">
                 <a:latin typeface="Calibri" panose="020F0502020204030204" pitchFamily="34" charset="0"/>
               </a:rPr>
-              <a:t> + 0xy + 0y2 = </a:t>
+              <a:t> + 0xy + 0y</a:t>
+            </a:r>
+            <a:r>
+              <a:rPr lang="en-US" sz="2600" baseline="30000" dirty="0">
+                <a:latin typeface="Calibri" panose="020F0502020204030204" pitchFamily="34" charset="0"/>
+              </a:rPr>
+              <a:t>2</a:t>
+            </a:r>
+            <a:r>
+              <a:rPr lang="en-US" sz="2600" dirty="0">
+                <a:latin typeface="Calibri" panose="020F0502020204030204" pitchFamily="34" charset="0"/>
+              </a:rPr>
+              <a:t> = </a:t>
             </a:r>
             <a:r>
               <a:rPr lang="en-US" sz="2600" b="1" dirty="0">
@@ -5289,7 +5237,19 @@
               <a:rPr lang="en-US" sz="2600" dirty="0">
                 <a:latin typeface="Calibri" panose="020F0502020204030204" pitchFamily="34" charset="0"/>
               </a:rPr>
-              <a:t> + 1xy + 0y2 = </a:t>
+              <a:t> + 1xy + 0y</a:t>
+            </a:r>
+            <a:r>
+              <a:rPr lang="en-US" sz="2600" baseline="30000" dirty="0">
+                <a:latin typeface="Calibri" panose="020F0502020204030204" pitchFamily="34" charset="0"/>
+              </a:rPr>
+              <a:t>2</a:t>
+            </a:r>
+            <a:r>
+              <a:rPr lang="en-US" sz="2600" dirty="0">
+                <a:latin typeface="Calibri" panose="020F0502020204030204" pitchFamily="34" charset="0"/>
+              </a:rPr>
+              <a:t> = </a:t>
             </a:r>
             <a:r>
               <a:rPr lang="en-US" sz="2600" b="1" dirty="0" err="1">
@@ -5319,7 +5279,19 @@
               <a:rPr lang="en-US" sz="2600" dirty="0">
                 <a:latin typeface="Calibri" panose="020F0502020204030204" pitchFamily="34" charset="0"/>
               </a:rPr>
-              <a:t> + 0xy + 1y2 = </a:t>
+              <a:t> + 0xy + 1y</a:t>
+            </a:r>
+            <a:r>
+              <a:rPr lang="en-US" sz="2600" baseline="30000" dirty="0">
+                <a:latin typeface="Calibri" panose="020F0502020204030204" pitchFamily="34" charset="0"/>
+              </a:rPr>
+              <a:t>2</a:t>
+            </a:r>
+            <a:r>
+              <a:rPr lang="en-US" sz="2600" dirty="0">
+                <a:latin typeface="Calibri" panose="020F0502020204030204" pitchFamily="34" charset="0"/>
+              </a:rPr>
+              <a:t> = </a:t>
             </a:r>
             <a:r>
               <a:rPr lang="en-US" sz="2600" b="1" dirty="0">
@@ -5645,24 +5617,29 @@
             </a:r>
             <a:r>
               <a:rPr lang="en-US" dirty="0"/>
-              <a:t>on R[</a:t>
-            </a:r>
-            <a:r>
-              <a:rPr lang="en-US" dirty="0" err="1"/>
+              <a:t>on </a:t>
+            </a:r>
+            <a:r>
+              <a:rPr lang="en-US" dirty="0" smtClean="0"/>
+              <a:t>R[</a:t>
+            </a:r>
+            <a:r>
+              <a:rPr lang="en-US" dirty="0" err="1" smtClean="0"/>
               <a:t>x,y</a:t>
             </a:r>
             <a:r>
-              <a:rPr lang="en-US" dirty="0"/>
+              <a:rPr lang="en-US" dirty="0" smtClean="0"/>
               <a:t>]</a:t>
             </a:r>
             <a:r>
-              <a:rPr lang="en-US" baseline="-25000" dirty="0"/>
-              <a:t>2</a:t>
-            </a:r>
-            <a:r>
-              <a:rPr lang="en-US" dirty="0"/>
+              <a:rPr lang="en-US" baseline="-25000" dirty="0" smtClean="0"/>
+              <a:t>k</a:t>
+            </a:r>
+            <a:r>
+              <a:rPr lang="en-US" dirty="0" smtClean="0"/>
               <a:t>  </a:t>
             </a:r>
+            <a:endParaRPr lang="en-US" dirty="0"/>
           </a:p>
         </p:txBody>
       </p:sp>
@@ -5769,7 +5746,7 @@
             </a:r>
             <a:r>
               <a:rPr lang="en-US" sz="2800" dirty="0" smtClean="0"/>
-              <a:t>n</a:t>
+              <a:t>k</a:t>
             </a:r>
             <a:r>
               <a:rPr lang="en-US" sz="3200" dirty="0" smtClean="0"/>
@@ -5884,15 +5861,15 @@
           <a:p>
             <a:r>
               <a:rPr lang="en-US" sz="3200" dirty="0" smtClean="0"/>
-              <a:t>For matrix action </a:t>
+              <a:t>For matrix </a:t>
             </a:r>
             <a:r>
               <a:rPr lang="en-US" sz="3200" i="1" dirty="0" smtClean="0"/>
-              <a:t>A </a:t>
+              <a:t>A, </a:t>
             </a:r>
             <a:r>
               <a:rPr lang="en-US" sz="3200" dirty="0" smtClean="0"/>
-              <a:t> and polynomials p and q:</a:t>
+              <a:t>polynomials p and q, and constant r:</a:t>
             </a:r>
             <a:endParaRPr lang="en-US" sz="3000" dirty="0" smtClean="0"/>
           </a:p>

</xml_diff>